<commit_message>
jenkins container added and nginx container swapped out with eagle
</commit_message>
<xml_diff>
--- a/pipeline/diagrams/architecture.pptx
+++ b/pipeline/diagrams/architecture.pptx
@@ -1714,7 +1714,7 @@
                 </a:solidFill>
                 <a:latin typeface="Calibri"/>
               </a:rPr>
-              <a:t>7/13/18</a:t>
+              <a:t>7/22/18</a:t>
             </a:fld>
             <a:endParaRPr lang="en-US" sz="1200" b="0" strike="noStrike" spc="-1">
               <a:latin typeface="Times New Roman"/>
@@ -2300,7 +2300,7 @@
         <p:spPr>
           <a:xfrm>
             <a:off x="2431224" y="780937"/>
-            <a:ext cx="7495370" cy="5200322"/>
+            <a:ext cx="7781784" cy="5200322"/>
           </a:xfrm>
           <a:prstGeom prst="roundRect">
             <a:avLst>
@@ -3539,6 +3539,538 @@
           </a:p>
         </p:txBody>
       </p:sp>
+      <p:grpSp>
+        <p:nvGrpSpPr>
+          <p:cNvPr id="4" name="Group 3">
+            <a:extLst>
+              <a:ext uri="{FF2B5EF4-FFF2-40B4-BE49-F238E27FC236}">
+                <a16:creationId xmlns:a16="http://schemas.microsoft.com/office/drawing/2014/main" id="{E6C4FEB7-3480-9845-839B-18E167E2C249}"/>
+              </a:ext>
+            </a:extLst>
+          </p:cNvPr>
+          <p:cNvGrpSpPr/>
+          <p:nvPr/>
+        </p:nvGrpSpPr>
+        <p:grpSpPr>
+          <a:xfrm>
+            <a:off x="9206448" y="3056396"/>
+            <a:ext cx="1006560" cy="871910"/>
+            <a:chOff x="9318873" y="3018921"/>
+            <a:chExt cx="1006560" cy="871910"/>
+          </a:xfrm>
+        </p:grpSpPr>
+        <p:pic>
+          <p:nvPicPr>
+            <p:cNvPr id="35" name="Picture 34">
+              <a:extLst>
+                <a:ext uri="{FF2B5EF4-FFF2-40B4-BE49-F238E27FC236}">
+                  <a16:creationId xmlns:a16="http://schemas.microsoft.com/office/drawing/2014/main" id="{D58BB00A-99B0-6140-9066-975AC5194F0D}"/>
+                </a:ext>
+              </a:extLst>
+            </p:cNvPr>
+            <p:cNvPicPr>
+              <a:picLocks noChangeAspect="1"/>
+            </p:cNvPicPr>
+            <p:nvPr/>
+          </p:nvPicPr>
+          <p:blipFill>
+            <a:blip r:embed="rId8">
+              <a:extLst>
+                <a:ext uri="{28A0092B-C50C-407E-A947-70E740481C1C}">
+                  <a14:useLocalDpi xmlns:a14="http://schemas.microsoft.com/office/drawing/2010/main" val="0"/>
+                </a:ext>
+              </a:extLst>
+            </a:blip>
+            <a:stretch>
+              <a:fillRect/>
+            </a:stretch>
+          </p:blipFill>
+          <p:spPr>
+            <a:xfrm>
+              <a:off x="9550507" y="3018921"/>
+              <a:ext cx="543292" cy="651950"/>
+            </a:xfrm>
+            <a:prstGeom prst="rect">
+              <a:avLst/>
+            </a:prstGeom>
+          </p:spPr>
+        </p:pic>
+        <p:sp>
+          <p:nvSpPr>
+            <p:cNvPr id="36" name="CustomShape 24">
+              <a:extLst>
+                <a:ext uri="{FF2B5EF4-FFF2-40B4-BE49-F238E27FC236}">
+                  <a16:creationId xmlns:a16="http://schemas.microsoft.com/office/drawing/2014/main" id="{CF00750C-055D-F24B-A0E8-05C6A6110B94}"/>
+                </a:ext>
+              </a:extLst>
+            </p:cNvPr>
+            <p:cNvSpPr/>
+            <p:nvPr/>
+          </p:nvSpPr>
+          <p:spPr>
+            <a:xfrm>
+              <a:off x="9318873" y="3648191"/>
+              <a:ext cx="1006560" cy="242640"/>
+            </a:xfrm>
+            <a:prstGeom prst="rect">
+              <a:avLst/>
+            </a:prstGeom>
+            <a:noFill/>
+            <a:ln>
+              <a:noFill/>
+            </a:ln>
+          </p:spPr>
+          <p:style>
+            <a:lnRef idx="0">
+              <a:scrgbClr r="0" g="0" b="0"/>
+            </a:lnRef>
+            <a:fillRef idx="0">
+              <a:scrgbClr r="0" g="0" b="0"/>
+            </a:fillRef>
+            <a:effectRef idx="0">
+              <a:scrgbClr r="0" g="0" b="0"/>
+            </a:effectRef>
+            <a:fontRef idx="minor"/>
+          </p:style>
+          <p:txBody>
+            <a:bodyPr lIns="90000" tIns="45000" rIns="90000" bIns="45000"/>
+            <a:lstStyle/>
+            <a:p>
+              <a:pPr algn="ctr">
+                <a:lnSpc>
+                  <a:spcPct val="100000"/>
+                </a:lnSpc>
+              </a:pPr>
+              <a:r>
+                <a:rPr lang="en-US" sz="1000" spc="-1" dirty="0">
+                  <a:latin typeface="Arial"/>
+                </a:rPr>
+                <a:t>EFS</a:t>
+              </a:r>
+              <a:endParaRPr lang="en-US" sz="1000" b="0" strike="noStrike" spc="-1" dirty="0">
+                <a:latin typeface="Arial"/>
+              </a:endParaRPr>
+            </a:p>
+          </p:txBody>
+        </p:sp>
+      </p:grpSp>
+      <p:pic>
+        <p:nvPicPr>
+          <p:cNvPr id="46" name="Picture 45">
+            <a:extLst>
+              <a:ext uri="{FF2B5EF4-FFF2-40B4-BE49-F238E27FC236}">
+                <a16:creationId xmlns:a16="http://schemas.microsoft.com/office/drawing/2014/main" id="{D365F363-3D4A-8A43-B9F1-1461E93E3121}"/>
+              </a:ext>
+            </a:extLst>
+          </p:cNvPr>
+          <p:cNvPicPr>
+            <a:picLocks noChangeAspect="1"/>
+          </p:cNvPicPr>
+          <p:nvPr/>
+        </p:nvPicPr>
+        <p:blipFill>
+          <a:blip r:embed="rId9">
+            <a:extLst>
+              <a:ext uri="{28A0092B-C50C-407E-A947-70E740481C1C}">
+                <a14:useLocalDpi xmlns:a14="http://schemas.microsoft.com/office/drawing/2010/main" val="0"/>
+              </a:ext>
+            </a:extLst>
+          </a:blip>
+          <a:stretch>
+            <a:fillRect/>
+          </a:stretch>
+        </p:blipFill>
+        <p:spPr>
+          <a:xfrm>
+            <a:off x="8167168" y="2978098"/>
+            <a:ext cx="412753" cy="372809"/>
+          </a:xfrm>
+          <a:prstGeom prst="rect">
+            <a:avLst/>
+          </a:prstGeom>
+        </p:spPr>
+      </p:pic>
+      <p:pic>
+        <p:nvPicPr>
+          <p:cNvPr id="48" name="Picture 47">
+            <a:extLst>
+              <a:ext uri="{FF2B5EF4-FFF2-40B4-BE49-F238E27FC236}">
+                <a16:creationId xmlns:a16="http://schemas.microsoft.com/office/drawing/2014/main" id="{58389722-A977-E24F-8A9E-F37373B657DD}"/>
+              </a:ext>
+            </a:extLst>
+          </p:cNvPr>
+          <p:cNvPicPr>
+            <a:picLocks noChangeAspect="1"/>
+          </p:cNvPicPr>
+          <p:nvPr/>
+        </p:nvPicPr>
+        <p:blipFill>
+          <a:blip r:embed="rId9">
+            <a:extLst>
+              <a:ext uri="{28A0092B-C50C-407E-A947-70E740481C1C}">
+                <a14:useLocalDpi xmlns:a14="http://schemas.microsoft.com/office/drawing/2010/main" val="0"/>
+              </a:ext>
+            </a:extLst>
+          </a:blip>
+          <a:stretch>
+            <a:fillRect/>
+          </a:stretch>
+        </p:blipFill>
+        <p:spPr>
+          <a:xfrm>
+            <a:off x="8197148" y="5004589"/>
+            <a:ext cx="412753" cy="372809"/>
+          </a:xfrm>
+          <a:prstGeom prst="rect">
+            <a:avLst/>
+          </a:prstGeom>
+        </p:spPr>
+      </p:pic>
+      <p:cxnSp>
+        <p:nvCxnSpPr>
+          <p:cNvPr id="6" name="Straight Connector 5">
+            <a:extLst>
+              <a:ext uri="{FF2B5EF4-FFF2-40B4-BE49-F238E27FC236}">
+                <a16:creationId xmlns:a16="http://schemas.microsoft.com/office/drawing/2014/main" id="{935D9E05-F403-F343-996A-2F90F9A51148}"/>
+              </a:ext>
+            </a:extLst>
+          </p:cNvPr>
+          <p:cNvCxnSpPr>
+            <a:stCxn id="46" idx="3"/>
+            <a:endCxn id="35" idx="1"/>
+          </p:cNvCxnSpPr>
+          <p:nvPr/>
+        </p:nvCxnSpPr>
+        <p:spPr>
+          <a:xfrm>
+            <a:off x="8579921" y="3164503"/>
+            <a:ext cx="858161" cy="217868"/>
+          </a:xfrm>
+          <a:prstGeom prst="line">
+            <a:avLst/>
+          </a:prstGeom>
+          <a:ln w="12700">
+            <a:solidFill>
+              <a:srgbClr val="FF0000"/>
+            </a:solidFill>
+            <a:prstDash val="dash"/>
+          </a:ln>
+        </p:spPr>
+        <p:style>
+          <a:lnRef idx="1">
+            <a:schemeClr val="accent1"/>
+          </a:lnRef>
+          <a:fillRef idx="0">
+            <a:schemeClr val="accent1"/>
+          </a:fillRef>
+          <a:effectRef idx="0">
+            <a:schemeClr val="accent1"/>
+          </a:effectRef>
+          <a:fontRef idx="minor">
+            <a:schemeClr val="tx1"/>
+          </a:fontRef>
+        </p:style>
+      </p:cxnSp>
+      <p:cxnSp>
+        <p:nvCxnSpPr>
+          <p:cNvPr id="49" name="Straight Connector 48">
+            <a:extLst>
+              <a:ext uri="{FF2B5EF4-FFF2-40B4-BE49-F238E27FC236}">
+                <a16:creationId xmlns:a16="http://schemas.microsoft.com/office/drawing/2014/main" id="{4284E20E-1AAF-134F-865C-97DF6A52EC54}"/>
+              </a:ext>
+            </a:extLst>
+          </p:cNvPr>
+          <p:cNvCxnSpPr>
+            <a:cxnSpLocks/>
+            <a:stCxn id="48" idx="3"/>
+            <a:endCxn id="35" idx="1"/>
+          </p:cNvCxnSpPr>
+          <p:nvPr/>
+        </p:nvCxnSpPr>
+        <p:spPr>
+          <a:xfrm flipV="1">
+            <a:off x="8609901" y="3382371"/>
+            <a:ext cx="828181" cy="1808623"/>
+          </a:xfrm>
+          <a:prstGeom prst="line">
+            <a:avLst/>
+          </a:prstGeom>
+          <a:ln w="12700">
+            <a:solidFill>
+              <a:srgbClr val="FF0000"/>
+            </a:solidFill>
+            <a:prstDash val="dash"/>
+          </a:ln>
+        </p:spPr>
+        <p:style>
+          <a:lnRef idx="1">
+            <a:schemeClr val="accent1"/>
+          </a:lnRef>
+          <a:fillRef idx="0">
+            <a:schemeClr val="accent1"/>
+          </a:fillRef>
+          <a:effectRef idx="0">
+            <a:schemeClr val="accent1"/>
+          </a:effectRef>
+          <a:fontRef idx="minor">
+            <a:schemeClr val="tx1"/>
+          </a:fontRef>
+        </p:style>
+      </p:cxnSp>
+      <p:grpSp>
+        <p:nvGrpSpPr>
+          <p:cNvPr id="13" name="Group 12">
+            <a:extLst>
+              <a:ext uri="{FF2B5EF4-FFF2-40B4-BE49-F238E27FC236}">
+                <a16:creationId xmlns:a16="http://schemas.microsoft.com/office/drawing/2014/main" id="{90355B33-3FD3-CA4B-8694-68807CC40F49}"/>
+              </a:ext>
+            </a:extLst>
+          </p:cNvPr>
+          <p:cNvGrpSpPr/>
+          <p:nvPr/>
+        </p:nvGrpSpPr>
+        <p:grpSpPr>
+          <a:xfrm>
+            <a:off x="7373247" y="1850915"/>
+            <a:ext cx="1420054" cy="538910"/>
+            <a:chOff x="7140902" y="1850915"/>
+            <a:chExt cx="1420054" cy="538910"/>
+          </a:xfrm>
+        </p:grpSpPr>
+        <p:pic>
+          <p:nvPicPr>
+            <p:cNvPr id="10" name="Picture 9">
+              <a:extLst>
+                <a:ext uri="{FF2B5EF4-FFF2-40B4-BE49-F238E27FC236}">
+                  <a16:creationId xmlns:a16="http://schemas.microsoft.com/office/drawing/2014/main" id="{072EF9CE-32D1-AA49-8650-FB1966180009}"/>
+                </a:ext>
+              </a:extLst>
+            </p:cNvPr>
+            <p:cNvPicPr>
+              <a:picLocks noChangeAspect="1"/>
+            </p:cNvPicPr>
+            <p:nvPr/>
+          </p:nvPicPr>
+          <p:blipFill>
+            <a:blip r:embed="rId10">
+              <a:extLst>
+                <a:ext uri="{28A0092B-C50C-407E-A947-70E740481C1C}">
+                  <a14:useLocalDpi xmlns:a14="http://schemas.microsoft.com/office/drawing/2010/main" val="0"/>
+                </a:ext>
+              </a:extLst>
+            </a:blip>
+            <a:stretch>
+              <a:fillRect/>
+            </a:stretch>
+          </p:blipFill>
+          <p:spPr>
+            <a:xfrm>
+              <a:off x="7140902" y="1850915"/>
+              <a:ext cx="389447" cy="538910"/>
+            </a:xfrm>
+            <a:prstGeom prst="rect">
+              <a:avLst/>
+            </a:prstGeom>
+          </p:spPr>
+        </p:pic>
+        <p:sp>
+          <p:nvSpPr>
+            <p:cNvPr id="50" name="CustomShape 42">
+              <a:extLst>
+                <a:ext uri="{FF2B5EF4-FFF2-40B4-BE49-F238E27FC236}">
+                  <a16:creationId xmlns:a16="http://schemas.microsoft.com/office/drawing/2014/main" id="{155C1EE1-D511-AD47-B0AD-C300960C3DEF}"/>
+                </a:ext>
+              </a:extLst>
+            </p:cNvPr>
+            <p:cNvSpPr/>
+            <p:nvPr/>
+          </p:nvSpPr>
+          <p:spPr>
+            <a:xfrm>
+              <a:off x="7492874" y="1972485"/>
+              <a:ext cx="1068082" cy="242640"/>
+            </a:xfrm>
+            <a:prstGeom prst="rect">
+              <a:avLst/>
+            </a:prstGeom>
+            <a:noFill/>
+            <a:ln>
+              <a:noFill/>
+            </a:ln>
+          </p:spPr>
+          <p:style>
+            <a:lnRef idx="0">
+              <a:scrgbClr r="0" g="0" b="0"/>
+            </a:lnRef>
+            <a:fillRef idx="0">
+              <a:scrgbClr r="0" g="0" b="0"/>
+            </a:fillRef>
+            <a:effectRef idx="0">
+              <a:scrgbClr r="0" g="0" b="0"/>
+            </a:effectRef>
+            <a:fontRef idx="minor"/>
+          </p:style>
+          <p:txBody>
+            <a:bodyPr lIns="90000" tIns="45000" rIns="90000" bIns="45000"/>
+            <a:lstStyle/>
+            <a:p>
+              <a:pPr>
+                <a:lnSpc>
+                  <a:spcPct val="100000"/>
+                </a:lnSpc>
+              </a:pPr>
+              <a:r>
+                <a:rPr lang="en-US" sz="1000" spc="-1" dirty="0">
+                  <a:solidFill>
+                    <a:srgbClr val="000000"/>
+                  </a:solidFill>
+                  <a:latin typeface="Arial"/>
+                </a:rPr>
+                <a:t>/</a:t>
+              </a:r>
+              <a:r>
+                <a:rPr lang="en-US" sz="1000" spc="-1" dirty="0" err="1">
+                  <a:solidFill>
+                    <a:srgbClr val="000000"/>
+                  </a:solidFill>
+                  <a:latin typeface="Arial"/>
+                </a:rPr>
+                <a:t>jenkins</a:t>
+              </a:r>
+              <a:r>
+                <a:rPr lang="en-US" sz="1000" spc="-1" dirty="0">
+                  <a:solidFill>
+                    <a:srgbClr val="000000"/>
+                  </a:solidFill>
+                  <a:latin typeface="Arial"/>
+                </a:rPr>
+                <a:t>/</a:t>
+              </a:r>
+              <a:endParaRPr lang="en-US" sz="1000" b="0" strike="noStrike" spc="-1" dirty="0">
+                <a:latin typeface="Arial"/>
+              </a:endParaRPr>
+            </a:p>
+          </p:txBody>
+        </p:sp>
+      </p:grpSp>
+      <p:grpSp>
+        <p:nvGrpSpPr>
+          <p:cNvPr id="14" name="Group 13">
+            <a:extLst>
+              <a:ext uri="{FF2B5EF4-FFF2-40B4-BE49-F238E27FC236}">
+                <a16:creationId xmlns:a16="http://schemas.microsoft.com/office/drawing/2014/main" id="{878206CF-DA0F-FB42-AC17-60C2833190E9}"/>
+              </a:ext>
+            </a:extLst>
+          </p:cNvPr>
+          <p:cNvGrpSpPr/>
+          <p:nvPr/>
+        </p:nvGrpSpPr>
+        <p:grpSpPr>
+          <a:xfrm>
+            <a:off x="7373247" y="4019028"/>
+            <a:ext cx="1501218" cy="397610"/>
+            <a:chOff x="7269598" y="2407020"/>
+            <a:chExt cx="1501218" cy="397610"/>
+          </a:xfrm>
+        </p:grpSpPr>
+        <p:pic>
+          <p:nvPicPr>
+            <p:cNvPr id="12" name="Picture 11">
+              <a:extLst>
+                <a:ext uri="{FF2B5EF4-FFF2-40B4-BE49-F238E27FC236}">
+                  <a16:creationId xmlns:a16="http://schemas.microsoft.com/office/drawing/2014/main" id="{B713FECB-E852-9044-BDA8-1A823908E366}"/>
+                </a:ext>
+              </a:extLst>
+            </p:cNvPr>
+            <p:cNvPicPr>
+              <a:picLocks noChangeAspect="1"/>
+            </p:cNvPicPr>
+            <p:nvPr/>
+          </p:nvPicPr>
+          <p:blipFill>
+            <a:blip r:embed="rId11">
+              <a:extLst>
+                <a:ext uri="{28A0092B-C50C-407E-A947-70E740481C1C}">
+                  <a14:useLocalDpi xmlns:a14="http://schemas.microsoft.com/office/drawing/2010/main" val="0"/>
+                </a:ext>
+              </a:extLst>
+            </a:blip>
+            <a:stretch>
+              <a:fillRect/>
+            </a:stretch>
+          </p:blipFill>
+          <p:spPr>
+            <a:xfrm>
+              <a:off x="7269598" y="2407020"/>
+              <a:ext cx="497012" cy="397610"/>
+            </a:xfrm>
+            <a:prstGeom prst="rect">
+              <a:avLst/>
+            </a:prstGeom>
+          </p:spPr>
+        </p:pic>
+        <p:sp>
+          <p:nvSpPr>
+            <p:cNvPr id="52" name="CustomShape 42">
+              <a:extLst>
+                <a:ext uri="{FF2B5EF4-FFF2-40B4-BE49-F238E27FC236}">
+                  <a16:creationId xmlns:a16="http://schemas.microsoft.com/office/drawing/2014/main" id="{7F3A59F0-1663-7D4F-964B-1B74765BD325}"/>
+                </a:ext>
+              </a:extLst>
+            </p:cNvPr>
+            <p:cNvSpPr/>
+            <p:nvPr/>
+          </p:nvSpPr>
+          <p:spPr>
+            <a:xfrm>
+              <a:off x="7702734" y="2461537"/>
+              <a:ext cx="1068082" cy="242640"/>
+            </a:xfrm>
+            <a:prstGeom prst="rect">
+              <a:avLst/>
+            </a:prstGeom>
+            <a:noFill/>
+            <a:ln>
+              <a:noFill/>
+            </a:ln>
+          </p:spPr>
+          <p:style>
+            <a:lnRef idx="0">
+              <a:scrgbClr r="0" g="0" b="0"/>
+            </a:lnRef>
+            <a:fillRef idx="0">
+              <a:scrgbClr r="0" g="0" b="0"/>
+            </a:fillRef>
+            <a:effectRef idx="0">
+              <a:scrgbClr r="0" g="0" b="0"/>
+            </a:effectRef>
+            <a:fontRef idx="minor"/>
+          </p:style>
+          <p:txBody>
+            <a:bodyPr lIns="90000" tIns="45000" rIns="90000" bIns="45000"/>
+            <a:lstStyle/>
+            <a:p>
+              <a:pPr>
+                <a:lnSpc>
+                  <a:spcPct val="100000"/>
+                </a:lnSpc>
+              </a:pPr>
+              <a:r>
+                <a:rPr lang="en-US" sz="1000" spc="-1" dirty="0">
+                  <a:solidFill>
+                    <a:srgbClr val="000000"/>
+                  </a:solidFill>
+                  <a:latin typeface="Arial"/>
+                </a:rPr>
+                <a:t>/</a:t>
+              </a:r>
+              <a:endParaRPr lang="en-US" sz="1000" b="0" strike="noStrike" spc="-1" dirty="0">
+                <a:latin typeface="Arial"/>
+              </a:endParaRPr>
+            </a:p>
+          </p:txBody>
+        </p:sp>
+      </p:grpSp>
     </p:spTree>
   </p:cSld>
   <p:clrMapOvr>

</xml_diff>